<commit_message>
add AutoNarration test; use UI thread to call features -> speed up!
</commit_message>
<xml_diff>
--- a/doc/test/AutoNarrate.pptx
+++ b/doc/test/AutoNarrate.pptx
@@ -17,7 +17,7 @@
     <p:sldId id="295" r:id="rId8"/>
     <p:sldId id="296" r:id="rId9"/>
     <p:sldId id="294" r:id="rId10"/>
-    <p:sldId id="297" r:id="rId11"/>
+    <p:sldId id="298" r:id="rId11"/>
     <p:sldId id="274" r:id="rId12"/>
   </p:sldIdLst>
   <p:sldSz cx="9144000" cy="6858000" type="screen4x3"/>
@@ -133,7 +133,7 @@
             <p14:sldId id="295"/>
             <p14:sldId id="296"/>
             <p14:sldId id="294"/>
-            <p14:sldId id="297"/>
+            <p14:sldId id="298"/>
             <p14:sldId id="274"/>
           </p14:sldIdLst>
         </p14:section>
@@ -239,7 +239,7 @@
           <a:p>
             <a:fld id="{26004F41-C1A1-4B0D-9EEE-5E3F0E5BC108}" type="datetimeFigureOut">
               <a:rPr lang="en-SG" smtClean="0"/>
-              <a:t>26/3/2014</a:t>
+              <a:t>21/6/2015</a:t>
             </a:fld>
             <a:endParaRPr lang="en-SG"/>
           </a:p>
@@ -1397,7 +1397,7 @@
     </p:spTree>
     <p:extLst>
       <p:ext uri="{BB962C8B-B14F-4D97-AF65-F5344CB8AC3E}">
-        <p14:creationId xmlns:p14="http://schemas.microsoft.com/office/powerpoint/2010/main" val="526036664"/>
+        <p14:creationId xmlns:p14="http://schemas.microsoft.com/office/powerpoint/2010/main" val="1994948051"/>
       </p:ext>
     </p:extLst>
   </p:cSld>
@@ -1588,7 +1588,7 @@
           <a:p>
             <a:fld id="{699DC775-C286-4358-8C92-D7E584E969B3}" type="datetimeFigureOut">
               <a:rPr lang="en-US" smtClean="0"/>
-              <a:t>3/26/2014</a:t>
+              <a:t>6/21/2015</a:t>
             </a:fld>
             <a:endParaRPr lang="en-US"/>
           </a:p>
@@ -1758,7 +1758,7 @@
           <a:p>
             <a:fld id="{699DC775-C286-4358-8C92-D7E584E969B3}" type="datetimeFigureOut">
               <a:rPr lang="en-US" smtClean="0"/>
-              <a:t>3/26/2014</a:t>
+              <a:t>6/21/2015</a:t>
             </a:fld>
             <a:endParaRPr lang="en-US"/>
           </a:p>
@@ -1938,7 +1938,7 @@
           <a:p>
             <a:fld id="{699DC775-C286-4358-8C92-D7E584E969B3}" type="datetimeFigureOut">
               <a:rPr lang="en-US" smtClean="0"/>
-              <a:t>3/26/2014</a:t>
+              <a:t>6/21/2015</a:t>
             </a:fld>
             <a:endParaRPr lang="en-US"/>
           </a:p>
@@ -2180,7 +2180,7 @@
           <a:p>
             <a:fld id="{699DC775-C286-4358-8C92-D7E584E969B3}" type="datetimeFigureOut">
               <a:rPr lang="en-US" smtClean="0"/>
-              <a:t>3/26/2014</a:t>
+              <a:t>6/21/2015</a:t>
             </a:fld>
             <a:endParaRPr lang="en-US"/>
           </a:p>
@@ -2350,7 +2350,7 @@
           <a:p>
             <a:fld id="{699DC775-C286-4358-8C92-D7E584E969B3}" type="datetimeFigureOut">
               <a:rPr lang="en-US" smtClean="0"/>
-              <a:t>3/26/2014</a:t>
+              <a:t>6/21/2015</a:t>
             </a:fld>
             <a:endParaRPr lang="en-US"/>
           </a:p>
@@ -2596,7 +2596,7 @@
           <a:p>
             <a:fld id="{699DC775-C286-4358-8C92-D7E584E969B3}" type="datetimeFigureOut">
               <a:rPr lang="en-US" smtClean="0"/>
-              <a:t>3/26/2014</a:t>
+              <a:t>6/21/2015</a:t>
             </a:fld>
             <a:endParaRPr lang="en-US"/>
           </a:p>
@@ -2884,7 +2884,7 @@
           <a:p>
             <a:fld id="{699DC775-C286-4358-8C92-D7E584E969B3}" type="datetimeFigureOut">
               <a:rPr lang="en-US" smtClean="0"/>
-              <a:t>3/26/2014</a:t>
+              <a:t>6/21/2015</a:t>
             </a:fld>
             <a:endParaRPr lang="en-US"/>
           </a:p>
@@ -3306,7 +3306,7 @@
           <a:p>
             <a:fld id="{699DC775-C286-4358-8C92-D7E584E969B3}" type="datetimeFigureOut">
               <a:rPr lang="en-US" smtClean="0"/>
-              <a:t>3/26/2014</a:t>
+              <a:t>6/21/2015</a:t>
             </a:fld>
             <a:endParaRPr lang="en-US"/>
           </a:p>
@@ -3424,7 +3424,7 @@
           <a:p>
             <a:fld id="{699DC775-C286-4358-8C92-D7E584E969B3}" type="datetimeFigureOut">
               <a:rPr lang="en-US" smtClean="0"/>
-              <a:t>3/26/2014</a:t>
+              <a:t>6/21/2015</a:t>
             </a:fld>
             <a:endParaRPr lang="en-US"/>
           </a:p>
@@ -3519,7 +3519,7 @@
           <a:p>
             <a:fld id="{699DC775-C286-4358-8C92-D7E584E969B3}" type="datetimeFigureOut">
               <a:rPr lang="en-US" smtClean="0"/>
-              <a:t>3/26/2014</a:t>
+              <a:t>6/21/2015</a:t>
             </a:fld>
             <a:endParaRPr lang="en-US"/>
           </a:p>
@@ -3796,7 +3796,7 @@
           <a:p>
             <a:fld id="{699DC775-C286-4358-8C92-D7E584E969B3}" type="datetimeFigureOut">
               <a:rPr lang="en-US" smtClean="0"/>
-              <a:t>3/26/2014</a:t>
+              <a:t>6/21/2015</a:t>
             </a:fld>
             <a:endParaRPr lang="en-US"/>
           </a:p>
@@ -3966,7 +3966,7 @@
           <a:p>
             <a:fld id="{699DC775-C286-4358-8C92-D7E584E969B3}" type="datetimeFigureOut">
               <a:rPr lang="en-US" smtClean="0"/>
-              <a:t>3/26/2014</a:t>
+              <a:t>6/21/2015</a:t>
             </a:fld>
             <a:endParaRPr lang="en-US"/>
           </a:p>
@@ -4219,7 +4219,7 @@
           <a:p>
             <a:fld id="{699DC775-C286-4358-8C92-D7E584E969B3}" type="datetimeFigureOut">
               <a:rPr lang="en-US" smtClean="0"/>
-              <a:t>3/26/2014</a:t>
+              <a:t>6/21/2015</a:t>
             </a:fld>
             <a:endParaRPr lang="en-US"/>
           </a:p>
@@ -4389,7 +4389,7 @@
           <a:p>
             <a:fld id="{699DC775-C286-4358-8C92-D7E584E969B3}" type="datetimeFigureOut">
               <a:rPr lang="en-US" smtClean="0"/>
-              <a:t>3/26/2014</a:t>
+              <a:t>6/21/2015</a:t>
             </a:fld>
             <a:endParaRPr lang="en-US"/>
           </a:p>
@@ -4569,7 +4569,7 @@
           <a:p>
             <a:fld id="{699DC775-C286-4358-8C92-D7E584E969B3}" type="datetimeFigureOut">
               <a:rPr lang="en-US" smtClean="0"/>
-              <a:t>3/26/2014</a:t>
+              <a:t>6/21/2015</a:t>
             </a:fld>
             <a:endParaRPr lang="en-US"/>
           </a:p>
@@ -4819,7 +4819,7 @@
           <a:p>
             <a:fld id="{699DC775-C286-4358-8C92-D7E584E969B3}" type="datetimeFigureOut">
               <a:rPr lang="en-US" smtClean="0"/>
-              <a:t>3/26/2014</a:t>
+              <a:t>6/21/2015</a:t>
             </a:fld>
             <a:endParaRPr lang="en-US"/>
           </a:p>
@@ -4997,7 +4997,7 @@
           <a:p>
             <a:fld id="{699DC775-C286-4358-8C92-D7E584E969B3}" type="datetimeFigureOut">
               <a:rPr lang="en-US" smtClean="0"/>
-              <a:t>3/26/2014</a:t>
+              <a:t>6/21/2015</a:t>
             </a:fld>
             <a:endParaRPr lang="en-US"/>
           </a:p>
@@ -5251,7 +5251,7 @@
           <a:p>
             <a:fld id="{699DC775-C286-4358-8C92-D7E584E969B3}" type="datetimeFigureOut">
               <a:rPr lang="en-US" smtClean="0"/>
-              <a:t>3/26/2014</a:t>
+              <a:t>6/21/2015</a:t>
             </a:fld>
             <a:endParaRPr lang="en-US"/>
           </a:p>
@@ -5547,7 +5547,7 @@
           <a:p>
             <a:fld id="{699DC775-C286-4358-8C92-D7E584E969B3}" type="datetimeFigureOut">
               <a:rPr lang="en-US" smtClean="0"/>
-              <a:t>3/26/2014</a:t>
+              <a:t>6/21/2015</a:t>
             </a:fld>
             <a:endParaRPr lang="en-US"/>
           </a:p>
@@ -5977,7 +5977,7 @@
           <a:p>
             <a:fld id="{699DC775-C286-4358-8C92-D7E584E969B3}" type="datetimeFigureOut">
               <a:rPr lang="en-US" smtClean="0"/>
-              <a:t>3/26/2014</a:t>
+              <a:t>6/21/2015</a:t>
             </a:fld>
             <a:endParaRPr lang="en-US"/>
           </a:p>
@@ -6103,7 +6103,7 @@
           <a:p>
             <a:fld id="{699DC775-C286-4358-8C92-D7E584E969B3}" type="datetimeFigureOut">
               <a:rPr lang="en-US" smtClean="0"/>
-              <a:t>3/26/2014</a:t>
+              <a:t>6/21/2015</a:t>
             </a:fld>
             <a:endParaRPr lang="en-US"/>
           </a:p>
@@ -6206,7 +6206,7 @@
           <a:p>
             <a:fld id="{699DC775-C286-4358-8C92-D7E584E969B3}" type="datetimeFigureOut">
               <a:rPr lang="en-US" smtClean="0"/>
-              <a:t>3/26/2014</a:t>
+              <a:t>6/21/2015</a:t>
             </a:fld>
             <a:endParaRPr lang="en-US"/>
           </a:p>
@@ -6452,7 +6452,7 @@
           <a:p>
             <a:fld id="{699DC775-C286-4358-8C92-D7E584E969B3}" type="datetimeFigureOut">
               <a:rPr lang="en-US" smtClean="0"/>
-              <a:t>3/26/2014</a:t>
+              <a:t>6/21/2015</a:t>
             </a:fld>
             <a:endParaRPr lang="en-US"/>
           </a:p>
@@ -6737,7 +6737,7 @@
           <a:p>
             <a:fld id="{699DC775-C286-4358-8C92-D7E584E969B3}" type="datetimeFigureOut">
               <a:rPr lang="en-US" smtClean="0"/>
-              <a:t>3/26/2014</a:t>
+              <a:t>6/21/2015</a:t>
             </a:fld>
             <a:endParaRPr lang="en-US"/>
           </a:p>
@@ -6998,7 +6998,7 @@
           <a:p>
             <a:fld id="{699DC775-C286-4358-8C92-D7E584E969B3}" type="datetimeFigureOut">
               <a:rPr lang="en-US" smtClean="0"/>
-              <a:t>3/26/2014</a:t>
+              <a:t>6/21/2015</a:t>
             </a:fld>
             <a:endParaRPr lang="en-US"/>
           </a:p>
@@ -7176,7 +7176,7 @@
           <a:p>
             <a:fld id="{699DC775-C286-4358-8C92-D7E584E969B3}" type="datetimeFigureOut">
               <a:rPr lang="en-US" smtClean="0"/>
-              <a:t>3/26/2014</a:t>
+              <a:t>6/21/2015</a:t>
             </a:fld>
             <a:endParaRPr lang="en-US"/>
           </a:p>
@@ -7364,7 +7364,7 @@
           <a:p>
             <a:fld id="{699DC775-C286-4358-8C92-D7E584E969B3}" type="datetimeFigureOut">
               <a:rPr lang="en-US" smtClean="0"/>
-              <a:t>3/26/2014</a:t>
+              <a:t>6/21/2015</a:t>
             </a:fld>
             <a:endParaRPr lang="en-US"/>
           </a:p>
@@ -7652,7 +7652,7 @@
           <a:p>
             <a:fld id="{699DC775-C286-4358-8C92-D7E584E969B3}" type="datetimeFigureOut">
               <a:rPr lang="en-US" smtClean="0"/>
-              <a:t>3/26/2014</a:t>
+              <a:t>6/21/2015</a:t>
             </a:fld>
             <a:endParaRPr lang="en-US"/>
           </a:p>
@@ -8074,7 +8074,7 @@
           <a:p>
             <a:fld id="{699DC775-C286-4358-8C92-D7E584E969B3}" type="datetimeFigureOut">
               <a:rPr lang="en-US" smtClean="0"/>
-              <a:t>3/26/2014</a:t>
+              <a:t>6/21/2015</a:t>
             </a:fld>
             <a:endParaRPr lang="en-US"/>
           </a:p>
@@ -8192,7 +8192,7 @@
           <a:p>
             <a:fld id="{699DC775-C286-4358-8C92-D7E584E969B3}" type="datetimeFigureOut">
               <a:rPr lang="en-US" smtClean="0"/>
-              <a:t>3/26/2014</a:t>
+              <a:t>6/21/2015</a:t>
             </a:fld>
             <a:endParaRPr lang="en-US"/>
           </a:p>
@@ -8287,7 +8287,7 @@
           <a:p>
             <a:fld id="{699DC775-C286-4358-8C92-D7E584E969B3}" type="datetimeFigureOut">
               <a:rPr lang="en-US" smtClean="0"/>
-              <a:t>3/26/2014</a:t>
+              <a:t>6/21/2015</a:t>
             </a:fld>
             <a:endParaRPr lang="en-US"/>
           </a:p>
@@ -8564,7 +8564,7 @@
           <a:p>
             <a:fld id="{699DC775-C286-4358-8C92-D7E584E969B3}" type="datetimeFigureOut">
               <a:rPr lang="en-US" smtClean="0"/>
-              <a:t>3/26/2014</a:t>
+              <a:t>6/21/2015</a:t>
             </a:fld>
             <a:endParaRPr lang="en-US"/>
           </a:p>
@@ -8817,7 +8817,7 @@
           <a:p>
             <a:fld id="{699DC775-C286-4358-8C92-D7E584E969B3}" type="datetimeFigureOut">
               <a:rPr lang="en-US" smtClean="0"/>
-              <a:t>3/26/2014</a:t>
+              <a:t>6/21/2015</a:t>
             </a:fld>
             <a:endParaRPr lang="en-US"/>
           </a:p>
@@ -9030,7 +9030,7 @@
           <a:p>
             <a:fld id="{699DC775-C286-4358-8C92-D7E584E969B3}" type="datetimeFigureOut">
               <a:rPr lang="en-US" smtClean="0"/>
-              <a:t>3/26/2014</a:t>
+              <a:t>6/21/2015</a:t>
             </a:fld>
             <a:endParaRPr lang="en-US"/>
           </a:p>
@@ -9545,7 +9545,7 @@
           <a:p>
             <a:fld id="{699DC775-C286-4358-8C92-D7E584E969B3}" type="datetimeFigureOut">
               <a:rPr lang="en-US" smtClean="0"/>
-              <a:t>3/26/2014</a:t>
+              <a:t>6/21/2015</a:t>
             </a:fld>
             <a:endParaRPr lang="en-US"/>
           </a:p>
@@ -10058,7 +10058,7 @@
           <a:p>
             <a:fld id="{699DC775-C286-4358-8C92-D7E584E969B3}" type="datetimeFigureOut">
               <a:rPr lang="en-US" smtClean="0"/>
-              <a:t>3/26/2014</a:t>
+              <a:t>6/21/2015</a:t>
             </a:fld>
             <a:endParaRPr lang="en-US"/>
           </a:p>
@@ -10729,15 +10729,7 @@
                   <a:schemeClr val="bg1"/>
                 </a:solidFill>
               </a:rPr>
-              <a:t>the </a:t>
-            </a:r>
-            <a:r>
-              <a:rPr lang="en-US" sz="2400" smtClean="0">
-                <a:solidFill>
-                  <a:schemeClr val="bg1"/>
-                </a:solidFill>
-              </a:rPr>
-              <a:t>ribbon.</a:t>
+              <a:t>the ribbon.</a:t>
             </a:r>
             <a:endParaRPr lang="en-US" sz="2400" dirty="0" smtClean="0">
               <a:solidFill>
@@ -12426,52 +12418,10 @@
           </a:prstGeom>
         </p:spPr>
       </p:pic>
-      <p:sp>
-        <p:nvSpPr>
-          <p:cNvPr id="12" name="text 3"/>
-          <p:cNvSpPr txBox="1"/>
-          <p:nvPr/>
-        </p:nvSpPr>
-        <p:spPr>
-          <a:xfrm>
-            <a:off x="381000" y="6182380"/>
-            <a:ext cx="2644122" cy="523220"/>
-          </a:xfrm>
-          <a:prstGeom prst="rect">
-            <a:avLst/>
-          </a:prstGeom>
-          <a:noFill/>
-        </p:spPr>
-        <p:txBody>
-          <a:bodyPr wrap="none" rtlCol="0">
-            <a:spAutoFit/>
-          </a:bodyPr>
-          <a:lstStyle/>
-          <a:p>
-            <a:r>
-              <a:rPr lang="en-US" sz="2800" b="1" dirty="0" smtClean="0">
-                <a:solidFill>
-                  <a:schemeClr val="bg1">
-                    <a:lumMod val="75000"/>
-                  </a:schemeClr>
-                </a:solidFill>
-              </a:rPr>
-              <a:t>Expected output</a:t>
-            </a:r>
-            <a:endParaRPr lang="en-SG" sz="2800" b="1" dirty="0">
-              <a:solidFill>
-                <a:schemeClr val="bg1">
-                  <a:lumMod val="75000"/>
-                </a:schemeClr>
-              </a:solidFill>
-            </a:endParaRPr>
-          </a:p>
-        </p:txBody>
-      </p:sp>
     </p:spTree>
     <p:extLst>
       <p:ext uri="{BB962C8B-B14F-4D97-AF65-F5344CB8AC3E}">
-        <p14:creationId xmlns:p14="http://schemas.microsoft.com/office/powerpoint/2010/main" val="3041797666"/>
+        <p14:creationId xmlns:p14="http://schemas.microsoft.com/office/powerpoint/2010/main" val="111132834"/>
       </p:ext>
     </p:extLst>
   </p:cSld>
@@ -12895,41 +12845,6 @@
                                   </p:childTnLst>
                                 </p:cTn>
                               </p:par>
-                              <p:par>
-                                <p:cTn id="37" presetID="10" presetClass="exit" presetSubtype="0" fill="hold" grpId="0" nodeType="withEffect">
-                                  <p:stCondLst>
-                                    <p:cond delay="0"/>
-                                  </p:stCondLst>
-                                  <p:childTnLst>
-                                    <p:animEffect transition="out" filter="fade">
-                                      <p:cBhvr>
-                                        <p:cTn id="38" dur="500"/>
-                                        <p:tgtEl>
-                                          <p:spTgt spid="12"/>
-                                        </p:tgtEl>
-                                      </p:cBhvr>
-                                    </p:animEffect>
-                                    <p:set>
-                                      <p:cBhvr>
-                                        <p:cTn id="39" dur="1" fill="hold">
-                                          <p:stCondLst>
-                                            <p:cond delay="499"/>
-                                          </p:stCondLst>
-                                        </p:cTn>
-                                        <p:tgtEl>
-                                          <p:spTgt spid="12"/>
-                                        </p:tgtEl>
-                                        <p:attrNameLst>
-                                          <p:attrName>style.visibility</p:attrName>
-                                        </p:attrNameLst>
-                                      </p:cBhvr>
-                                      <p:to>
-                                        <p:strVal val="hidden"/>
-                                      </p:to>
-                                    </p:set>
-                                  </p:childTnLst>
-                                </p:cTn>
-                              </p:par>
                             </p:childTnLst>
                           </p:cTn>
                         </p:par>
@@ -12955,7 +12870,7 @@
             </p:seq>
             <p:audio>
               <p:cMediaNode vol="80000">
-                <p:cTn id="40" fill="hold" display="0">
+                <p:cTn id="37" fill="hold" display="0">
                   <p:stCondLst>
                     <p:cond delay="indefinite"/>
                   </p:stCondLst>
@@ -12974,7 +12889,7 @@
             </p:audio>
             <p:audio>
               <p:cMediaNode vol="80000">
-                <p:cTn id="41" fill="hold" display="0">
+                <p:cTn id="38" fill="hold" display="0">
                   <p:stCondLst>
                     <p:cond delay="indefinite"/>
                   </p:stCondLst>
@@ -12993,7 +12908,7 @@
             </p:audio>
             <p:audio>
               <p:cMediaNode vol="80000">
-                <p:cTn id="42" fill="hold" display="0">
+                <p:cTn id="39" fill="hold" display="0">
                   <p:stCondLst>
                     <p:cond delay="indefinite"/>
                   </p:stCondLst>
@@ -13012,7 +12927,7 @@
             </p:audio>
             <p:audio>
               <p:cMediaNode vol="80000">
-                <p:cTn id="43" fill="hold" display="0">
+                <p:cTn id="40" fill="hold" display="0">
                   <p:stCondLst>
                     <p:cond delay="indefinite"/>
                   </p:stCondLst>
@@ -13040,7 +12955,6 @@
       <p:bldP spid="7" grpId="0" animBg="1" autoUpdateAnimBg="0"/>
       <p:bldP spid="13" grpId="0" animBg="1" autoUpdateAnimBg="0"/>
       <p:bldP spid="20" grpId="0" animBg="1" autoUpdateAnimBg="0"/>
-      <p:bldP spid="12" grpId="0"/>
     </p:bldLst>
   </p:timing>
 </p:sld>

</xml_diff>